<commit_message>
add use case example
</commit_message>
<xml_diff>
--- a/NOSQL - document stores.pptx
+++ b/NOSQL - document stores.pptx
@@ -5,10 +5,10 @@
     <p:sldMasterId id="2147483648" r:id="rId1"/>
   </p:sldMasterIdLst>
   <p:notesMasterIdLst>
-    <p:notesMasterId r:id="rId17"/>
+    <p:notesMasterId r:id="rId18"/>
   </p:notesMasterIdLst>
   <p:handoutMasterIdLst>
-    <p:handoutMasterId r:id="rId18"/>
+    <p:handoutMasterId r:id="rId19"/>
   </p:handoutMasterIdLst>
   <p:sldIdLst>
     <p:sldId id="256" r:id="rId2"/>
@@ -23,9 +23,10 @@
     <p:sldId id="282" r:id="rId11"/>
     <p:sldId id="279" r:id="rId12"/>
     <p:sldId id="280" r:id="rId13"/>
-    <p:sldId id="273" r:id="rId14"/>
-    <p:sldId id="272" r:id="rId15"/>
-    <p:sldId id="281" r:id="rId16"/>
+    <p:sldId id="284" r:id="rId14"/>
+    <p:sldId id="273" r:id="rId15"/>
+    <p:sldId id="272" r:id="rId16"/>
+    <p:sldId id="281" r:id="rId17"/>
   </p:sldIdLst>
   <p:sldSz cx="12192000" cy="6858000"/>
   <p:notesSz cx="6858000" cy="9144000"/>
@@ -6573,7 +6574,12 @@
             <p:ph type="title"/>
           </p:nvPr>
         </p:nvSpPr>
-        <p:spPr/>
+        <p:spPr>
+          <a:xfrm>
+            <a:off x="695400" y="457200"/>
+            <a:ext cx="9144000" cy="1143000"/>
+          </a:xfrm>
+        </p:spPr>
         <p:txBody>
           <a:bodyPr/>
           <a:lstStyle/>
@@ -6847,6 +6853,55 @@
       </p:grpSpPr>
       <p:sp>
         <p:nvSpPr>
+          <p:cNvPr id="6" name="Rectangle 5">
+            <a:extLst>
+              <a:ext uri="{FF2B5EF4-FFF2-40B4-BE49-F238E27FC236}">
+                <a16:creationId xmlns:a16="http://schemas.microsoft.com/office/drawing/2014/main" id="{0DA8015F-C73B-2C06-204E-A90C401E542D}"/>
+              </a:ext>
+            </a:extLst>
+          </p:cNvPr>
+          <p:cNvSpPr/>
+          <p:nvPr/>
+        </p:nvSpPr>
+        <p:spPr>
+          <a:xfrm>
+            <a:off x="767408" y="1700808"/>
+            <a:ext cx="10585176" cy="4699992"/>
+          </a:xfrm>
+          <a:prstGeom prst="rect">
+            <a:avLst/>
+          </a:prstGeom>
+          <a:solidFill>
+            <a:schemeClr val="tx1"/>
+          </a:solidFill>
+        </p:spPr>
+        <p:style>
+          <a:lnRef idx="2">
+            <a:schemeClr val="accent1">
+              <a:shade val="50000"/>
+            </a:schemeClr>
+          </a:lnRef>
+          <a:fillRef idx="1">
+            <a:schemeClr val="accent1"/>
+          </a:fillRef>
+          <a:effectRef idx="0">
+            <a:schemeClr val="accent1"/>
+          </a:effectRef>
+          <a:fontRef idx="minor">
+            <a:schemeClr val="lt1"/>
+          </a:fontRef>
+        </p:style>
+        <p:txBody>
+          <a:bodyPr rtlCol="0" anchor="ctr"/>
+          <a:lstStyle/>
+          <a:p>
+            <a:pPr algn="ctr"/>
+            <a:endParaRPr lang="en-150"/>
+          </a:p>
+        </p:txBody>
+      </p:sp>
+      <p:sp>
+        <p:nvSpPr>
           <p:cNvPr id="13" name="Title 12"/>
           <p:cNvSpPr>
             <a:spLocks noGrp="1"/>
@@ -6855,14 +6910,19 @@
             <p:ph type="title"/>
           </p:nvPr>
         </p:nvSpPr>
-        <p:spPr/>
+        <p:spPr>
+          <a:xfrm>
+            <a:off x="781766" y="493812"/>
+            <a:ext cx="9144000" cy="1143000"/>
+          </a:xfrm>
+        </p:spPr>
         <p:txBody>
           <a:bodyPr/>
           <a:lstStyle/>
           <a:p>
             <a:r>
               <a:rPr lang="en-US" dirty="0"/>
-              <a:t>REFERENCES</a:t>
+              <a:t>A use case example in automotive</a:t>
             </a:r>
             <a:endParaRPr dirty="0"/>
           </a:p>
@@ -6883,65 +6943,80 @@
           <a:bodyPr/>
           <a:lstStyle/>
           <a:p>
-            <a:r>
-              <a:rPr lang="en-US" dirty="0"/>
-              <a:t>Link: </a:t>
-            </a:r>
-            <a:r>
-              <a:rPr lang="en-US" dirty="0">
-                <a:hlinkClick r:id="rId2"/>
-              </a:rPr>
-              <a:t>https://www.mongodb.com/document-databases</a:t>
-            </a:r>
-            <a:r>
-              <a:rPr lang="en-US" dirty="0"/>
-              <a:t> </a:t>
-            </a:r>
-            <a:endParaRPr dirty="0"/>
-          </a:p>
-          <a:p>
-            <a:r>
-              <a:rPr lang="en-US" dirty="0"/>
-              <a:t>Link: </a:t>
-            </a:r>
-            <a:r>
-              <a:rPr lang="en-US" dirty="0">
-                <a:hlinkClick r:id="rId3"/>
-              </a:rPr>
-              <a:t>https://database.guide/what-is-a-document-store-database/</a:t>
-            </a:r>
+            <a:pPr marL="365760" lvl="1" indent="0">
+              <a:buNone/>
+            </a:pPr>
             <a:endParaRPr lang="en-US" dirty="0"/>
           </a:p>
           <a:p>
-            <a:r>
-              <a:rPr lang="en-US" dirty="0"/>
-              <a:t>Link: </a:t>
-            </a:r>
-            <a:r>
-              <a:rPr lang="en-US" dirty="0">
-                <a:hlinkClick r:id="rId4"/>
-              </a:rPr>
-              <a:t>https://phoenixnap.com/kb/document-database</a:t>
-            </a:r>
-            <a:r>
-              <a:rPr lang="en-US" dirty="0"/>
-              <a:t>  </a:t>
-            </a:r>
-            <a:endParaRPr dirty="0"/>
-          </a:p>
-          <a:p>
-            <a:r>
-              <a:rPr lang="en-US" dirty="0"/>
-              <a:t>Lectures from lesson “Technologies for Big Data Analytics”</a:t>
-            </a:r>
-            <a:endParaRPr dirty="0"/>
-          </a:p>
-        </p:txBody>
-      </p:sp>
+            <a:pPr marL="365760" lvl="1" indent="0">
+              <a:buNone/>
+            </a:pPr>
+            <a:endParaRPr lang="en-US" dirty="0"/>
+          </a:p>
+          <a:p>
+            <a:pPr marL="365760" lvl="1" indent="0">
+              <a:buNone/>
+            </a:pPr>
+            <a:endParaRPr lang="en-US" dirty="0"/>
+          </a:p>
+          <a:p>
+            <a:pPr marL="365760" lvl="1" indent="0">
+              <a:buNone/>
+            </a:pPr>
+            <a:endParaRPr lang="en-US" dirty="0"/>
+          </a:p>
+          <a:p>
+            <a:pPr marL="685800" lvl="2" indent="0">
+              <a:buNone/>
+            </a:pPr>
+            <a:endParaRPr lang="en-US" dirty="0"/>
+          </a:p>
+          <a:p>
+            <a:endParaRPr lang="en-150" dirty="0"/>
+          </a:p>
+        </p:txBody>
+      </p:sp>
+      <p:pic>
+        <p:nvPicPr>
+          <p:cNvPr id="3" name="Picture 2" descr="Diagram">
+            <a:extLst>
+              <a:ext uri="{FF2B5EF4-FFF2-40B4-BE49-F238E27FC236}">
+                <a16:creationId xmlns:a16="http://schemas.microsoft.com/office/drawing/2014/main" id="{9481C47B-2ECC-4DD1-0598-995BE9B5A0EC}"/>
+              </a:ext>
+            </a:extLst>
+          </p:cNvPr>
+          <p:cNvPicPr>
+            <a:picLocks noChangeAspect="1"/>
+          </p:cNvPicPr>
+          <p:nvPr/>
+        </p:nvPicPr>
+        <p:blipFill>
+          <a:blip r:embed="rId2">
+            <a:extLst>
+              <a:ext uri="{28A0092B-C50C-407E-A947-70E740481C1C}">
+                <a14:useLocalDpi xmlns:a14="http://schemas.microsoft.com/office/drawing/2010/main" val="0"/>
+              </a:ext>
+            </a:extLst>
+          </a:blip>
+          <a:stretch>
+            <a:fillRect/>
+          </a:stretch>
+        </p:blipFill>
+        <p:spPr>
+          <a:xfrm>
+            <a:off x="767408" y="1700808"/>
+            <a:ext cx="10585176" cy="4699992"/>
+          </a:xfrm>
+          <a:prstGeom prst="rect">
+            <a:avLst/>
+          </a:prstGeom>
+        </p:spPr>
+      </p:pic>
     </p:spTree>
     <p:extLst>
       <p:ext uri="{BB962C8B-B14F-4D97-AF65-F5344CB8AC3E}">
-        <p14:creationId xmlns:p14="http://schemas.microsoft.com/office/powerpoint/2010/main" val="2902951903"/>
+        <p14:creationId xmlns:p14="http://schemas.microsoft.com/office/powerpoint/2010/main" val="124908298"/>
       </p:ext>
     </p:extLst>
   </p:cSld>
@@ -6970,6 +7045,146 @@
       </p:grpSpPr>
       <p:sp>
         <p:nvSpPr>
+          <p:cNvPr id="13" name="Title 12"/>
+          <p:cNvSpPr>
+            <a:spLocks noGrp="1"/>
+          </p:cNvSpPr>
+          <p:nvPr>
+            <p:ph type="title"/>
+          </p:nvPr>
+        </p:nvSpPr>
+        <p:spPr/>
+        <p:txBody>
+          <a:bodyPr/>
+          <a:lstStyle/>
+          <a:p>
+            <a:r>
+              <a:rPr lang="en-US" dirty="0"/>
+              <a:t>REFERENCES</a:t>
+            </a:r>
+            <a:endParaRPr dirty="0"/>
+          </a:p>
+        </p:txBody>
+      </p:sp>
+      <p:sp>
+        <p:nvSpPr>
+          <p:cNvPr id="14" name="Content Placeholder 13"/>
+          <p:cNvSpPr>
+            <a:spLocks noGrp="1"/>
+          </p:cNvSpPr>
+          <p:nvPr>
+            <p:ph idx="1"/>
+          </p:nvPr>
+        </p:nvSpPr>
+        <p:spPr/>
+        <p:txBody>
+          <a:bodyPr/>
+          <a:lstStyle/>
+          <a:p>
+            <a:r>
+              <a:rPr lang="en-US" dirty="0"/>
+              <a:t>Link: </a:t>
+            </a:r>
+            <a:r>
+              <a:rPr lang="en-US" dirty="0">
+                <a:hlinkClick r:id="rId2"/>
+              </a:rPr>
+              <a:t>https://www.mongodb.com/document-databases</a:t>
+            </a:r>
+            <a:r>
+              <a:rPr lang="en-US" dirty="0"/>
+              <a:t> </a:t>
+            </a:r>
+            <a:endParaRPr dirty="0"/>
+          </a:p>
+          <a:p>
+            <a:r>
+              <a:rPr lang="en-US" dirty="0"/>
+              <a:t>Link: </a:t>
+            </a:r>
+            <a:r>
+              <a:rPr lang="en-US" dirty="0">
+                <a:hlinkClick r:id="rId3"/>
+              </a:rPr>
+              <a:t>https://database.guide/what-is-a-document-store-database/</a:t>
+            </a:r>
+            <a:endParaRPr lang="en-US" dirty="0"/>
+          </a:p>
+          <a:p>
+            <a:r>
+              <a:rPr lang="en-US" dirty="0"/>
+              <a:t>Link: </a:t>
+            </a:r>
+            <a:r>
+              <a:rPr lang="en-US" dirty="0">
+                <a:hlinkClick r:id="rId4"/>
+              </a:rPr>
+              <a:t>https://phoenixnap.com/kb/document-database</a:t>
+            </a:r>
+            <a:r>
+              <a:rPr lang="en-US" dirty="0"/>
+              <a:t>  </a:t>
+            </a:r>
+            <a:endParaRPr lang="el-GR" dirty="0"/>
+          </a:p>
+          <a:p>
+            <a:r>
+              <a:rPr lang="en-US"/>
+              <a:t>Link: </a:t>
+            </a:r>
+            <a:r>
+              <a:rPr lang="en-US">
+                <a:hlinkClick r:id="rId5"/>
+              </a:rPr>
+              <a:t>https://www.youtube.com/watch?v=8DmKum_Uhcg</a:t>
+            </a:r>
+            <a:r>
+              <a:rPr lang="en-US"/>
+              <a:t> </a:t>
+            </a:r>
+            <a:endParaRPr dirty="0"/>
+          </a:p>
+          <a:p>
+            <a:r>
+              <a:rPr lang="en-US" dirty="0"/>
+              <a:t>Lectures from lesson “Technologies for Big Data Analytics”</a:t>
+            </a:r>
+            <a:endParaRPr dirty="0"/>
+          </a:p>
+        </p:txBody>
+      </p:sp>
+    </p:spTree>
+    <p:extLst>
+      <p:ext uri="{BB962C8B-B14F-4D97-AF65-F5344CB8AC3E}">
+        <p14:creationId xmlns:p14="http://schemas.microsoft.com/office/powerpoint/2010/main" val="2902951903"/>
+      </p:ext>
+    </p:extLst>
+  </p:cSld>
+  <p:clrMapOvr>
+    <a:masterClrMapping/>
+  </p:clrMapOvr>
+</p:sld>
+</file>
+
+<file path=ppt/slides/slide15.xml><?xml version="1.0" encoding="utf-8"?>
+<p:sld xmlns:a="http://schemas.openxmlformats.org/drawingml/2006/main" xmlns:r="http://schemas.openxmlformats.org/officeDocument/2006/relationships" xmlns:p="http://schemas.openxmlformats.org/presentationml/2006/main">
+  <p:cSld>
+    <p:spTree>
+      <p:nvGrpSpPr>
+        <p:cNvPr id="1" name=""/>
+        <p:cNvGrpSpPr/>
+        <p:nvPr/>
+      </p:nvGrpSpPr>
+      <p:grpSpPr>
+        <a:xfrm>
+          <a:off x="0" y="0"/>
+          <a:ext cx="0" cy="0"/>
+          <a:chOff x="0" y="0"/>
+          <a:chExt cx="0" cy="0"/>
+        </a:xfrm>
+      </p:grpSpPr>
+      <p:sp>
+        <p:nvSpPr>
           <p:cNvPr id="2" name="Title 1"/>
           <p:cNvSpPr>
             <a:spLocks noGrp="1"/>
@@ -7012,7 +7227,7 @@
 </p:sld>
 </file>
 
-<file path=ppt/slides/slide15.xml><?xml version="1.0" encoding="utf-8"?>
+<file path=ppt/slides/slide16.xml><?xml version="1.0" encoding="utf-8"?>
 <p:sld xmlns:a="http://schemas.openxmlformats.org/drawingml/2006/main" xmlns:r="http://schemas.openxmlformats.org/officeDocument/2006/relationships" xmlns:p="http://schemas.openxmlformats.org/presentationml/2006/main">
   <p:cSld>
     <p:spTree>
@@ -7421,7 +7636,12 @@
             <p:ph type="title"/>
           </p:nvPr>
         </p:nvSpPr>
-        <p:spPr/>
+        <p:spPr>
+          <a:xfrm>
+            <a:off x="766593" y="435983"/>
+            <a:ext cx="9144000" cy="1143000"/>
+          </a:xfrm>
+        </p:spPr>
         <p:txBody>
           <a:bodyPr/>
           <a:lstStyle/>
@@ -9139,7 +9359,12 @@
             <p:ph type="title"/>
           </p:nvPr>
         </p:nvSpPr>
-        <p:spPr/>
+        <p:spPr>
+          <a:xfrm>
+            <a:off x="745495" y="476672"/>
+            <a:ext cx="9144000" cy="1143000"/>
+          </a:xfrm>
+        </p:spPr>
         <p:txBody>
           <a:bodyPr/>
           <a:lstStyle/>

</xml_diff>